<commit_message>
Kész, de iszonyat ronda
</commit_message>
<xml_diff>
--- a/zenekeszites.pptx
+++ b/zenekeszites.pptx
@@ -11,6 +11,7 @@
     <p:sldId id="259" r:id="rId5"/>
     <p:sldId id="260" r:id="rId6"/>
     <p:sldId id="261" r:id="rId7"/>
+    <p:sldId id="262" r:id="rId8"/>
   </p:sldIdLst>
   <p:sldSz cx="12192000" cy="6858000"/>
   <p:notesSz cx="6858000" cy="9144000"/>
@@ -264,7 +265,7 @@
           <a:p>
             <a:fld id="{17AC1CCA-D49E-4DC0-B7E3-A1EA754F95C9}" type="datetimeFigureOut">
               <a:rPr lang="hu-HU" smtClean="0"/>
-              <a:t>2025. 09. 15.</a:t>
+              <a:t>2025. 09. 21.</a:t>
             </a:fld>
             <a:endParaRPr lang="hu-HU"/>
           </a:p>
@@ -462,7 +463,7 @@
           <a:p>
             <a:fld id="{17AC1CCA-D49E-4DC0-B7E3-A1EA754F95C9}" type="datetimeFigureOut">
               <a:rPr lang="hu-HU" smtClean="0"/>
-              <a:t>2025. 09. 15.</a:t>
+              <a:t>2025. 09. 21.</a:t>
             </a:fld>
             <a:endParaRPr lang="hu-HU"/>
           </a:p>
@@ -670,7 +671,7 @@
           <a:p>
             <a:fld id="{17AC1CCA-D49E-4DC0-B7E3-A1EA754F95C9}" type="datetimeFigureOut">
               <a:rPr lang="hu-HU" smtClean="0"/>
-              <a:t>2025. 09. 15.</a:t>
+              <a:t>2025. 09. 21.</a:t>
             </a:fld>
             <a:endParaRPr lang="hu-HU"/>
           </a:p>
@@ -868,7 +869,7 @@
           <a:p>
             <a:fld id="{17AC1CCA-D49E-4DC0-B7E3-A1EA754F95C9}" type="datetimeFigureOut">
               <a:rPr lang="hu-HU" smtClean="0"/>
-              <a:t>2025. 09. 15.</a:t>
+              <a:t>2025. 09. 21.</a:t>
             </a:fld>
             <a:endParaRPr lang="hu-HU"/>
           </a:p>
@@ -1143,7 +1144,7 @@
           <a:p>
             <a:fld id="{17AC1CCA-D49E-4DC0-B7E3-A1EA754F95C9}" type="datetimeFigureOut">
               <a:rPr lang="hu-HU" smtClean="0"/>
-              <a:t>2025. 09. 15.</a:t>
+              <a:t>2025. 09. 21.</a:t>
             </a:fld>
             <a:endParaRPr lang="hu-HU"/>
           </a:p>
@@ -1408,7 +1409,7 @@
           <a:p>
             <a:fld id="{17AC1CCA-D49E-4DC0-B7E3-A1EA754F95C9}" type="datetimeFigureOut">
               <a:rPr lang="hu-HU" smtClean="0"/>
-              <a:t>2025. 09. 15.</a:t>
+              <a:t>2025. 09. 21.</a:t>
             </a:fld>
             <a:endParaRPr lang="hu-HU"/>
           </a:p>
@@ -1820,7 +1821,7 @@
           <a:p>
             <a:fld id="{17AC1CCA-D49E-4DC0-B7E3-A1EA754F95C9}" type="datetimeFigureOut">
               <a:rPr lang="hu-HU" smtClean="0"/>
-              <a:t>2025. 09. 15.</a:t>
+              <a:t>2025. 09. 21.</a:t>
             </a:fld>
             <a:endParaRPr lang="hu-HU"/>
           </a:p>
@@ -1961,7 +1962,7 @@
           <a:p>
             <a:fld id="{17AC1CCA-D49E-4DC0-B7E3-A1EA754F95C9}" type="datetimeFigureOut">
               <a:rPr lang="hu-HU" smtClean="0"/>
-              <a:t>2025. 09. 15.</a:t>
+              <a:t>2025. 09. 21.</a:t>
             </a:fld>
             <a:endParaRPr lang="hu-HU"/>
           </a:p>
@@ -2074,7 +2075,7 @@
           <a:p>
             <a:fld id="{17AC1CCA-D49E-4DC0-B7E3-A1EA754F95C9}" type="datetimeFigureOut">
               <a:rPr lang="hu-HU" smtClean="0"/>
-              <a:t>2025. 09. 15.</a:t>
+              <a:t>2025. 09. 21.</a:t>
             </a:fld>
             <a:endParaRPr lang="hu-HU"/>
           </a:p>
@@ -2385,7 +2386,7 @@
           <a:p>
             <a:fld id="{17AC1CCA-D49E-4DC0-B7E3-A1EA754F95C9}" type="datetimeFigureOut">
               <a:rPr lang="hu-HU" smtClean="0"/>
-              <a:t>2025. 09. 15.</a:t>
+              <a:t>2025. 09. 21.</a:t>
             </a:fld>
             <a:endParaRPr lang="hu-HU"/>
           </a:p>
@@ -2673,7 +2674,7 @@
           <a:p>
             <a:fld id="{17AC1CCA-D49E-4DC0-B7E3-A1EA754F95C9}" type="datetimeFigureOut">
               <a:rPr lang="hu-HU" smtClean="0"/>
-              <a:t>2025. 09. 15.</a:t>
+              <a:t>2025. 09. 21.</a:t>
             </a:fld>
             <a:endParaRPr lang="hu-HU"/>
           </a:p>
@@ -2924,7 +2925,7 @@
           <a:p>
             <a:fld id="{17AC1CCA-D49E-4DC0-B7E3-A1EA754F95C9}" type="datetimeFigureOut">
               <a:rPr lang="hu-HU" smtClean="0"/>
-              <a:t>2025. 09. 15.</a:t>
+              <a:t>2025. 09. 21.</a:t>
             </a:fld>
             <a:endParaRPr lang="hu-HU"/>
           </a:p>
@@ -4098,15 +4099,119 @@
           <a:chExt cx="0" cy="0"/>
         </a:xfrm>
       </p:grpSpPr>
-      <p:sp>
-        <p:nvSpPr>
-          <p:cNvPr id="2" name="Cím 1">
-            <a:extLst>
-              <a:ext uri="{FF2B5EF4-FFF2-40B4-BE49-F238E27FC236}">
-                <a16:creationId xmlns:a16="http://schemas.microsoft.com/office/drawing/2014/main" id="{CBFB0104-3B88-4159-8E66-B0E48F9EBFBB}"/>
-              </a:ext>
-            </a:extLst>
-          </p:cNvPr>
+      <p:pic>
+        <p:nvPicPr>
+          <p:cNvPr id="6" name="Picture 3" descr="Mixing Songs with a DAW: Techniques, Tools, and Tips"/>
+          <p:cNvPicPr>
+            <a:picLocks noChangeAspect="1" noChangeArrowheads="1"/>
+          </p:cNvPicPr>
+          <p:nvPr/>
+        </p:nvPicPr>
+        <p:blipFill>
+          <a:blip r:embed="rId2">
+            <a:extLst>
+              <a:ext uri="{28A0092B-C50C-407E-A947-70E740481C1C}">
+                <a14:useLocalDpi xmlns:a14="http://schemas.microsoft.com/office/drawing/2010/main" val="0"/>
+              </a:ext>
+            </a:extLst>
+          </a:blip>
+          <a:srcRect/>
+          <a:stretch>
+            <a:fillRect/>
+          </a:stretch>
+        </p:blipFill>
+        <p:spPr bwMode="auto">
+          <a:xfrm>
+            <a:off x="3092288" y="2030024"/>
+            <a:ext cx="6578485" cy="3700398"/>
+          </a:xfrm>
+          <a:prstGeom prst="rect">
+            <a:avLst/>
+          </a:prstGeom>
+          <a:solidFill>
+            <a:srgbClr val="FFFFFF">
+              <a:shade val="85000"/>
+            </a:srgbClr>
+          </a:solidFill>
+          <a:ln w="190500" cap="rnd">
+            <a:solidFill>
+              <a:srgbClr val="FFFFFF"/>
+            </a:solidFill>
+          </a:ln>
+          <a:effectLst>
+            <a:outerShdw blurRad="36195" dist="12700" dir="11400000" algn="tl" rotWithShape="0">
+              <a:srgbClr val="000000">
+                <a:alpha val="33000"/>
+              </a:srgbClr>
+            </a:outerShdw>
+          </a:effectLst>
+          <a:scene3d>
+            <a:camera prst="perspectiveContrastingLeftFacing">
+              <a:rot lat="540000" lon="2100000" rev="0"/>
+            </a:camera>
+            <a:lightRig rig="soft" dir="t"/>
+          </a:scene3d>
+          <a:sp3d contourW="12700" prstMaterial="matte">
+            <a:bevelT w="63500" h="50800"/>
+            <a:contourClr>
+              <a:srgbClr val="C0C0C0"/>
+            </a:contourClr>
+          </a:sp3d>
+        </p:spPr>
+      </p:pic>
+      <p:sp>
+        <p:nvSpPr>
+          <p:cNvPr id="10" name="Ellipszis 9"/>
+          <p:cNvSpPr/>
+          <p:nvPr/>
+        </p:nvSpPr>
+        <p:spPr>
+          <a:xfrm>
+            <a:off x="9670774" y="4446104"/>
+            <a:ext cx="3627783" cy="3319669"/>
+          </a:xfrm>
+          <a:prstGeom prst="ellipse">
+            <a:avLst/>
+          </a:prstGeom>
+          <a:solidFill>
+            <a:schemeClr val="accent5">
+              <a:lumMod val="75000"/>
+            </a:schemeClr>
+          </a:solidFill>
+          <a:ln>
+            <a:solidFill>
+              <a:schemeClr val="tx1"/>
+            </a:solidFill>
+          </a:ln>
+        </p:spPr>
+        <p:style>
+          <a:lnRef idx="2">
+            <a:schemeClr val="accent1">
+              <a:shade val="50000"/>
+            </a:schemeClr>
+          </a:lnRef>
+          <a:fillRef idx="1">
+            <a:schemeClr val="accent1"/>
+          </a:fillRef>
+          <a:effectRef idx="0">
+            <a:schemeClr val="accent1"/>
+          </a:effectRef>
+          <a:fontRef idx="minor">
+            <a:schemeClr val="lt1"/>
+          </a:fontRef>
+        </p:style>
+        <p:txBody>
+          <a:bodyPr rtlCol="0" anchor="ctr"/>
+          <a:lstStyle/>
+          <a:p>
+            <a:pPr algn="ctr"/>
+            <a:endParaRPr lang="hu-HU"/>
+          </a:p>
+        </p:txBody>
+      </p:sp>
+      <p:sp>
+        <p:nvSpPr>
+          <p:cNvPr id="2" name="Cím 1"/>
           <p:cNvSpPr>
             <a:spLocks noGrp="1"/>
           </p:cNvSpPr>
@@ -4119,31 +4224,484 @@
           <a:bodyPr/>
           <a:lstStyle/>
           <a:p>
+            <a:pPr algn="ctr"/>
+            <a:r>
+              <a:rPr lang="hu-HU" b="1" dirty="0"/>
+              <a:t>Mixing</a:t>
+            </a:r>
+          </a:p>
+        </p:txBody>
+      </p:sp>
+      <p:sp>
+        <p:nvSpPr>
+          <p:cNvPr id="5" name="Rectangle 1"/>
+          <p:cNvSpPr>
+            <a:spLocks noChangeArrowheads="1"/>
+          </p:cNvSpPr>
+          <p:nvPr/>
+        </p:nvSpPr>
+        <p:spPr bwMode="auto">
+          <a:xfrm>
+            <a:off x="838200" y="2628805"/>
+            <a:ext cx="3004038" cy="2585323"/>
+          </a:xfrm>
+          <a:prstGeom prst="rect">
+            <a:avLst/>
+          </a:prstGeom>
+          <a:noFill/>
+          <a:ln>
+            <a:noFill/>
+          </a:ln>
+          <a:effectLst/>
+          <a:extLst>
+            <a:ext uri="{909E8E84-426E-40DD-AFC4-6F175D3DCCD1}">
+              <a14:hiddenFill xmlns:a14="http://schemas.microsoft.com/office/drawing/2010/main">
+                <a:solidFill>
+                  <a:schemeClr val="accent1"/>
+                </a:solidFill>
+              </a14:hiddenFill>
+            </a:ext>
+            <a:ext uri="{91240B29-F687-4F45-9708-019B960494DF}">
+              <a14:hiddenLine xmlns:a14="http://schemas.microsoft.com/office/drawing/2010/main" w="9525">
+                <a:solidFill>
+                  <a:schemeClr val="tx1"/>
+                </a:solidFill>
+                <a:miter lim="800000"/>
+                <a:headEnd/>
+                <a:tailEnd/>
+              </a14:hiddenLine>
+            </a:ext>
+            <a:ext uri="{AF507438-7753-43E0-B8FC-AC1667EBCBE1}">
+              <a14:hiddenEffects xmlns:a14="http://schemas.microsoft.com/office/drawing/2010/main">
+                <a:effectLst>
+                  <a:outerShdw dist="35921" dir="2700000" algn="ctr" rotWithShape="0">
+                    <a:schemeClr val="bg2"/>
+                  </a:outerShdw>
+                </a:effectLst>
+              </a14:hiddenEffects>
+            </a:ext>
+          </a:extLst>
+        </p:spPr>
+        <p:txBody>
+          <a:bodyPr vert="horz" wrap="square" lIns="91440" tIns="45720" rIns="91440" bIns="45720" numCol="1" anchor="ctr" anchorCtr="0" compatLnSpc="1">
+            <a:prstTxWarp prst="textNoShape">
+              <a:avLst/>
+            </a:prstTxWarp>
+            <a:spAutoFit/>
+          </a:bodyPr>
+          <a:lstStyle/>
+          <a:p>
+            <a:pPr marL="0" marR="0" lvl="0" indent="0" algn="l" defTabSz="914400" rtl="0" eaLnBrk="0" fontAlgn="base" latinLnBrk="0" hangingPunct="0">
+              <a:lnSpc>
+                <a:spcPct val="100000"/>
+              </a:lnSpc>
+              <a:spcBef>
+                <a:spcPct val="0"/>
+              </a:spcBef>
+              <a:spcAft>
+                <a:spcPct val="0"/>
+              </a:spcAft>
+              <a:buClrTx/>
+              <a:buSzTx/>
+              <a:tabLst/>
+            </a:pPr>
+            <a:r>
+              <a:rPr lang="hu-HU" altLang="hu-HU" u="sng" dirty="0">
+                <a:latin typeface="Arial" panose="020B0604020202020204" pitchFamily="34" charset="0"/>
+              </a:rPr>
+              <a:t>Röviden:</a:t>
+            </a:r>
+            <a:endParaRPr kumimoji="0" lang="hu-HU" altLang="hu-HU" sz="1800" b="0" i="0" u="sng" strike="noStrike" cap="none" normalizeH="0" baseline="0" dirty="0">
+              <a:ln>
+                <a:noFill/>
+              </a:ln>
+              <a:solidFill>
+                <a:schemeClr val="tx1"/>
+              </a:solidFill>
+              <a:effectLst/>
+              <a:latin typeface="Arial" panose="020B0604020202020204" pitchFamily="34" charset="0"/>
+            </a:endParaRPr>
+          </a:p>
+          <a:p>
+            <a:pPr marL="0" marR="0" lvl="0" indent="0" algn="l" defTabSz="914400" rtl="0" eaLnBrk="0" fontAlgn="base" latinLnBrk="0" hangingPunct="0">
+              <a:lnSpc>
+                <a:spcPct val="100000"/>
+              </a:lnSpc>
+              <a:spcBef>
+                <a:spcPct val="0"/>
+              </a:spcBef>
+              <a:spcAft>
+                <a:spcPct val="0"/>
+              </a:spcAft>
+              <a:buClrTx/>
+              <a:buSzTx/>
+              <a:buFontTx/>
+              <a:buChar char="•"/>
+              <a:tabLst/>
+            </a:pPr>
+            <a:endParaRPr kumimoji="0" lang="hu-HU" altLang="hu-HU" sz="1800" b="0" i="0" u="none" strike="noStrike" cap="none" normalizeH="0" baseline="0" dirty="0">
+              <a:ln>
+                <a:noFill/>
+              </a:ln>
+              <a:solidFill>
+                <a:schemeClr val="tx1"/>
+              </a:solidFill>
+              <a:effectLst/>
+              <a:latin typeface="Arial" panose="020B0604020202020204" pitchFamily="34" charset="0"/>
+            </a:endParaRPr>
+          </a:p>
+          <a:p>
+            <a:pPr marL="0" marR="0" lvl="0" indent="0" algn="l" defTabSz="914400" rtl="0" eaLnBrk="0" fontAlgn="base" latinLnBrk="0" hangingPunct="0">
+              <a:lnSpc>
+                <a:spcPct val="100000"/>
+              </a:lnSpc>
+              <a:spcBef>
+                <a:spcPct val="0"/>
+              </a:spcBef>
+              <a:spcAft>
+                <a:spcPct val="0"/>
+              </a:spcAft>
+              <a:buClrTx/>
+              <a:buSzTx/>
+              <a:buFontTx/>
+              <a:buChar char="•"/>
+              <a:tabLst/>
+            </a:pPr>
+            <a:r>
+              <a:rPr kumimoji="0" lang="hu-HU" altLang="hu-HU" sz="1800" b="0" i="0" u="none" strike="noStrike" cap="none" normalizeH="0" baseline="0" dirty="0">
+                <a:ln>
+                  <a:noFill/>
+                </a:ln>
+                <a:solidFill>
+                  <a:schemeClr val="tx1"/>
+                </a:solidFill>
+                <a:effectLst/>
+                <a:latin typeface="Arial" panose="020B0604020202020204" pitchFamily="34" charset="0"/>
+              </a:rPr>
+              <a:t>Hangszerek aránya</a:t>
+            </a:r>
+          </a:p>
+          <a:p>
+            <a:pPr marL="0" marR="0" lvl="0" indent="0" algn="l" defTabSz="914400" rtl="0" eaLnBrk="0" fontAlgn="base" latinLnBrk="0" hangingPunct="0">
+              <a:lnSpc>
+                <a:spcPct val="100000"/>
+              </a:lnSpc>
+              <a:spcBef>
+                <a:spcPct val="0"/>
+              </a:spcBef>
+              <a:spcAft>
+                <a:spcPct val="0"/>
+              </a:spcAft>
+              <a:buClrTx/>
+              <a:buSzTx/>
+              <a:buFontTx/>
+              <a:buChar char="•"/>
+              <a:tabLst/>
+            </a:pPr>
+            <a:endParaRPr kumimoji="0" lang="hu-HU" altLang="hu-HU" sz="1800" b="0" i="0" u="none" strike="noStrike" cap="none" normalizeH="0" baseline="0" dirty="0">
+              <a:ln>
+                <a:noFill/>
+              </a:ln>
+              <a:solidFill>
+                <a:schemeClr val="tx1"/>
+              </a:solidFill>
+              <a:effectLst/>
+              <a:latin typeface="Arial" panose="020B0604020202020204" pitchFamily="34" charset="0"/>
+            </a:endParaRPr>
+          </a:p>
+          <a:p>
+            <a:pPr marL="0" marR="0" lvl="0" indent="0" algn="l" defTabSz="914400" rtl="0" eaLnBrk="0" fontAlgn="base" latinLnBrk="0" hangingPunct="0">
+              <a:lnSpc>
+                <a:spcPct val="100000"/>
+              </a:lnSpc>
+              <a:spcBef>
+                <a:spcPct val="0"/>
+              </a:spcBef>
+              <a:spcAft>
+                <a:spcPct val="0"/>
+              </a:spcAft>
+              <a:buClrTx/>
+              <a:buSzTx/>
+              <a:buFontTx/>
+              <a:buChar char="•"/>
+              <a:tabLst/>
+            </a:pPr>
+            <a:r>
+              <a:rPr kumimoji="0" lang="hu-HU" altLang="hu-HU" sz="1800" b="0" i="0" u="none" strike="noStrike" cap="none" normalizeH="0" baseline="0" dirty="0">
+                <a:ln>
+                  <a:noFill/>
+                </a:ln>
+                <a:solidFill>
+                  <a:schemeClr val="tx1"/>
+                </a:solidFill>
+                <a:effectLst/>
+                <a:latin typeface="Arial" panose="020B0604020202020204" pitchFamily="34" charset="0"/>
+              </a:rPr>
+              <a:t>Bal–jobb tér, mélység</a:t>
+            </a:r>
+          </a:p>
+          <a:p>
+            <a:pPr marL="0" marR="0" lvl="0" indent="0" algn="l" defTabSz="914400" rtl="0" eaLnBrk="0" fontAlgn="base" latinLnBrk="0" hangingPunct="0">
+              <a:lnSpc>
+                <a:spcPct val="100000"/>
+              </a:lnSpc>
+              <a:spcBef>
+                <a:spcPct val="0"/>
+              </a:spcBef>
+              <a:spcAft>
+                <a:spcPct val="0"/>
+              </a:spcAft>
+              <a:buClrTx/>
+              <a:buSzTx/>
+              <a:buFontTx/>
+              <a:buChar char="•"/>
+              <a:tabLst/>
+            </a:pPr>
+            <a:endParaRPr kumimoji="0" lang="hu-HU" altLang="hu-HU" sz="1800" b="0" i="0" u="none" strike="noStrike" cap="none" normalizeH="0" baseline="0" dirty="0">
+              <a:ln>
+                <a:noFill/>
+              </a:ln>
+              <a:solidFill>
+                <a:schemeClr val="tx1"/>
+              </a:solidFill>
+              <a:effectLst/>
+              <a:latin typeface="Arial" panose="020B0604020202020204" pitchFamily="34" charset="0"/>
+            </a:endParaRPr>
+          </a:p>
+          <a:p>
+            <a:pPr marL="0" marR="0" lvl="0" indent="0" algn="l" defTabSz="914400" rtl="0" eaLnBrk="0" fontAlgn="base" latinLnBrk="0" hangingPunct="0">
+              <a:lnSpc>
+                <a:spcPct val="100000"/>
+              </a:lnSpc>
+              <a:spcBef>
+                <a:spcPct val="0"/>
+              </a:spcBef>
+              <a:spcAft>
+                <a:spcPct val="0"/>
+              </a:spcAft>
+              <a:buClrTx/>
+              <a:buSzTx/>
+              <a:buFontTx/>
+              <a:buChar char="•"/>
+              <a:tabLst/>
+            </a:pPr>
+            <a:r>
+              <a:rPr kumimoji="0" lang="hu-HU" altLang="hu-HU" sz="1800" b="0" i="0" u="none" strike="noStrike" cap="none" normalizeH="0" baseline="0" dirty="0">
+                <a:ln>
+                  <a:noFill/>
+                </a:ln>
+                <a:solidFill>
+                  <a:schemeClr val="tx1"/>
+                </a:solidFill>
+                <a:effectLst/>
+                <a:latin typeface="Arial" panose="020B0604020202020204" pitchFamily="34" charset="0"/>
+              </a:rPr>
+              <a:t>Hangszínek formálása</a:t>
+            </a:r>
+          </a:p>
+          <a:p>
+            <a:pPr marL="0" marR="0" lvl="0" indent="0" algn="l" defTabSz="914400" rtl="0" eaLnBrk="0" fontAlgn="base" latinLnBrk="0" hangingPunct="0">
+              <a:lnSpc>
+                <a:spcPct val="100000"/>
+              </a:lnSpc>
+              <a:spcBef>
+                <a:spcPct val="0"/>
+              </a:spcBef>
+              <a:spcAft>
+                <a:spcPct val="0"/>
+              </a:spcAft>
+              <a:buClrTx/>
+              <a:buSzTx/>
+              <a:buFontTx/>
+              <a:buChar char="•"/>
+              <a:tabLst/>
+            </a:pPr>
+            <a:endParaRPr kumimoji="0" lang="hu-HU" altLang="hu-HU" sz="1800" b="0" i="0" u="none" strike="noStrike" cap="none" normalizeH="0" baseline="0" dirty="0">
+              <a:ln>
+                <a:noFill/>
+              </a:ln>
+              <a:solidFill>
+                <a:schemeClr val="tx1"/>
+              </a:solidFill>
+              <a:effectLst/>
+              <a:latin typeface="Arial" panose="020B0604020202020204" pitchFamily="34" charset="0"/>
+            </a:endParaRPr>
+          </a:p>
+          <a:p>
+            <a:pPr marL="0" marR="0" lvl="0" indent="0" algn="l" defTabSz="914400" rtl="0" eaLnBrk="0" fontAlgn="base" latinLnBrk="0" hangingPunct="0">
+              <a:lnSpc>
+                <a:spcPct val="100000"/>
+              </a:lnSpc>
+              <a:spcBef>
+                <a:spcPct val="0"/>
+              </a:spcBef>
+              <a:spcAft>
+                <a:spcPct val="0"/>
+              </a:spcAft>
+              <a:buClrTx/>
+              <a:buSzTx/>
+              <a:buFontTx/>
+              <a:buChar char="•"/>
+              <a:tabLst/>
+            </a:pPr>
+            <a:r>
+              <a:rPr kumimoji="0" lang="hu-HU" altLang="hu-HU" sz="1800" b="0" i="0" u="none" strike="noStrike" cap="none" normalizeH="0" baseline="0" dirty="0">
+                <a:ln>
+                  <a:noFill/>
+                </a:ln>
+                <a:solidFill>
+                  <a:schemeClr val="tx1"/>
+                </a:solidFill>
+                <a:effectLst/>
+                <a:latin typeface="Arial" panose="020B0604020202020204" pitchFamily="34" charset="0"/>
+              </a:rPr>
+              <a:t>Egyensúly, tisztaság</a:t>
+            </a:r>
+          </a:p>
+        </p:txBody>
+      </p:sp>
+      <p:sp>
+        <p:nvSpPr>
+          <p:cNvPr id="7" name="Ellipszis 6"/>
+          <p:cNvSpPr/>
+          <p:nvPr/>
+        </p:nvSpPr>
+        <p:spPr>
+          <a:xfrm>
+            <a:off x="1466403" y="365125"/>
+            <a:ext cx="1747631" cy="1664899"/>
+          </a:xfrm>
+          <a:prstGeom prst="ellipse">
+            <a:avLst/>
+          </a:prstGeom>
+          <a:solidFill>
+            <a:srgbClr val="C00000"/>
+          </a:solidFill>
+          <a:ln>
+            <a:solidFill>
+              <a:schemeClr val="tx1"/>
+            </a:solidFill>
+          </a:ln>
+        </p:spPr>
+        <p:style>
+          <a:lnRef idx="2">
+            <a:schemeClr val="accent1">
+              <a:shade val="50000"/>
+            </a:schemeClr>
+          </a:lnRef>
+          <a:fillRef idx="1">
+            <a:schemeClr val="accent1"/>
+          </a:fillRef>
+          <a:effectRef idx="0">
+            <a:schemeClr val="accent1"/>
+          </a:effectRef>
+          <a:fontRef idx="minor">
+            <a:schemeClr val="lt1"/>
+          </a:fontRef>
+        </p:style>
+        <p:txBody>
+          <a:bodyPr rtlCol="0" anchor="ctr"/>
+          <a:lstStyle/>
+          <a:p>
+            <a:pPr algn="ctr"/>
             <a:endParaRPr lang="hu-HU"/>
           </a:p>
         </p:txBody>
       </p:sp>
       <p:sp>
         <p:nvSpPr>
-          <p:cNvPr id="3" name="Tartalom helye 2">
-            <a:extLst>
-              <a:ext uri="{FF2B5EF4-FFF2-40B4-BE49-F238E27FC236}">
-                <a16:creationId xmlns:a16="http://schemas.microsoft.com/office/drawing/2014/main" id="{8D1B9627-63BA-4C1E-A915-AEE3F84864AD}"/>
-              </a:ext>
-            </a:extLst>
-          </p:cNvPr>
-          <p:cNvSpPr>
-            <a:spLocks noGrp="1"/>
-          </p:cNvSpPr>
-          <p:nvPr>
-            <p:ph idx="1"/>
-          </p:nvPr>
-        </p:nvSpPr>
-        <p:spPr/>
-        <p:txBody>
-          <a:bodyPr/>
-          <a:lstStyle/>
-          <a:p>
+          <p:cNvPr id="8" name="Ellipszis 7"/>
+          <p:cNvSpPr/>
+          <p:nvPr/>
+        </p:nvSpPr>
+        <p:spPr>
+          <a:xfrm>
+            <a:off x="8576572" y="5035652"/>
+            <a:ext cx="2188403" cy="2140571"/>
+          </a:xfrm>
+          <a:prstGeom prst="ellipse">
+            <a:avLst/>
+          </a:prstGeom>
+          <a:solidFill>
+            <a:srgbClr val="C00000"/>
+          </a:solidFill>
+          <a:ln>
+            <a:solidFill>
+              <a:schemeClr val="tx1"/>
+            </a:solidFill>
+          </a:ln>
+        </p:spPr>
+        <p:style>
+          <a:lnRef idx="2">
+            <a:schemeClr val="accent1">
+              <a:shade val="50000"/>
+            </a:schemeClr>
+          </a:lnRef>
+          <a:fillRef idx="1">
+            <a:schemeClr val="accent1"/>
+          </a:fillRef>
+          <a:effectRef idx="0">
+            <a:schemeClr val="accent1"/>
+          </a:effectRef>
+          <a:fontRef idx="minor">
+            <a:schemeClr val="lt1"/>
+          </a:fontRef>
+        </p:style>
+        <p:txBody>
+          <a:bodyPr rtlCol="0" anchor="ctr"/>
+          <a:lstStyle/>
+          <a:p>
+            <a:pPr algn="ctr"/>
+            <a:endParaRPr lang="hu-HU"/>
+          </a:p>
+        </p:txBody>
+      </p:sp>
+      <p:sp>
+        <p:nvSpPr>
+          <p:cNvPr id="9" name="Ellipszis 8"/>
+          <p:cNvSpPr/>
+          <p:nvPr/>
+        </p:nvSpPr>
+        <p:spPr>
+          <a:xfrm>
+            <a:off x="-1174474" y="-995319"/>
+            <a:ext cx="3627783" cy="3319669"/>
+          </a:xfrm>
+          <a:prstGeom prst="ellipse">
+            <a:avLst/>
+          </a:prstGeom>
+          <a:solidFill>
+            <a:schemeClr val="accent2">
+              <a:lumMod val="50000"/>
+            </a:schemeClr>
+          </a:solidFill>
+          <a:ln>
+            <a:solidFill>
+              <a:schemeClr val="tx1"/>
+            </a:solidFill>
+          </a:ln>
+        </p:spPr>
+        <p:style>
+          <a:lnRef idx="2">
+            <a:schemeClr val="accent1">
+              <a:shade val="50000"/>
+            </a:schemeClr>
+          </a:lnRef>
+          <a:fillRef idx="1">
+            <a:schemeClr val="accent1"/>
+          </a:fillRef>
+          <a:effectRef idx="0">
+            <a:schemeClr val="accent1"/>
+          </a:effectRef>
+          <a:fontRef idx="minor">
+            <a:schemeClr val="lt1"/>
+          </a:fontRef>
+        </p:style>
+        <p:txBody>
+          <a:bodyPr rtlCol="0" anchor="ctr"/>
+          <a:lstStyle/>
+          <a:p>
+            <a:pPr algn="ctr"/>
             <a:endParaRPr lang="hu-HU"/>
           </a:p>
         </p:txBody>
@@ -4151,13 +4709,1156 @@
     </p:spTree>
     <p:extLst>
       <p:ext uri="{BB962C8B-B14F-4D97-AF65-F5344CB8AC3E}">
-        <p14:creationId xmlns:p14="http://schemas.microsoft.com/office/powerpoint/2010/main" val="4106435726"/>
+        <p14:creationId xmlns:p14="http://schemas.microsoft.com/office/powerpoint/2010/main" val="3557497532"/>
       </p:ext>
     </p:extLst>
   </p:cSld>
   <p:clrMapOvr>
     <a:masterClrMapping/>
   </p:clrMapOvr>
+  <p:timing>
+    <p:tnLst>
+      <p:par>
+        <p:cTn id="1" dur="indefinite" restart="never" nodeType="tmRoot">
+          <p:childTnLst>
+            <p:seq concurrent="1" nextAc="seek">
+              <p:cTn id="2" dur="indefinite" nodeType="mainSeq">
+                <p:childTnLst>
+                  <p:par>
+                    <p:cTn id="3" fill="hold">
+                      <p:stCondLst>
+                        <p:cond delay="indefinite"/>
+                        <p:cond evt="onBegin" delay="0">
+                          <p:tn val="2"/>
+                        </p:cond>
+                      </p:stCondLst>
+                      <p:childTnLst>
+                        <p:par>
+                          <p:cTn id="4" fill="hold">
+                            <p:stCondLst>
+                              <p:cond delay="0"/>
+                            </p:stCondLst>
+                            <p:childTnLst>
+                              <p:par>
+                                <p:cTn id="5" presetID="2" presetClass="entr" presetSubtype="9" fill="hold" grpId="0" nodeType="withEffect">
+                                  <p:stCondLst>
+                                    <p:cond delay="0"/>
+                                  </p:stCondLst>
+                                  <p:childTnLst>
+                                    <p:set>
+                                      <p:cBhvr>
+                                        <p:cTn id="6" dur="1" fill="hold">
+                                          <p:stCondLst>
+                                            <p:cond delay="0"/>
+                                          </p:stCondLst>
+                                        </p:cTn>
+                                        <p:tgtEl>
+                                          <p:spTgt spid="9"/>
+                                        </p:tgtEl>
+                                        <p:attrNameLst>
+                                          <p:attrName>style.visibility</p:attrName>
+                                        </p:attrNameLst>
+                                      </p:cBhvr>
+                                      <p:to>
+                                        <p:strVal val="visible"/>
+                                      </p:to>
+                                    </p:set>
+                                    <p:anim calcmode="lin" valueType="num">
+                                      <p:cBhvr additive="base">
+                                        <p:cTn id="7" dur="750" fill="hold"/>
+                                        <p:tgtEl>
+                                          <p:spTgt spid="9"/>
+                                        </p:tgtEl>
+                                        <p:attrNameLst>
+                                          <p:attrName>ppt_x</p:attrName>
+                                        </p:attrNameLst>
+                                      </p:cBhvr>
+                                      <p:tavLst>
+                                        <p:tav tm="0">
+                                          <p:val>
+                                            <p:strVal val="0-#ppt_w/2"/>
+                                          </p:val>
+                                        </p:tav>
+                                        <p:tav tm="100000">
+                                          <p:val>
+                                            <p:strVal val="#ppt_x"/>
+                                          </p:val>
+                                        </p:tav>
+                                      </p:tavLst>
+                                    </p:anim>
+                                    <p:anim calcmode="lin" valueType="num">
+                                      <p:cBhvr additive="base">
+                                        <p:cTn id="8" dur="750" fill="hold"/>
+                                        <p:tgtEl>
+                                          <p:spTgt spid="9"/>
+                                        </p:tgtEl>
+                                        <p:attrNameLst>
+                                          <p:attrName>ppt_y</p:attrName>
+                                        </p:attrNameLst>
+                                      </p:cBhvr>
+                                      <p:tavLst>
+                                        <p:tav tm="0">
+                                          <p:val>
+                                            <p:strVal val="0-#ppt_h/2"/>
+                                          </p:val>
+                                        </p:tav>
+                                        <p:tav tm="100000">
+                                          <p:val>
+                                            <p:strVal val="#ppt_y"/>
+                                          </p:val>
+                                        </p:tav>
+                                      </p:tavLst>
+                                    </p:anim>
+                                  </p:childTnLst>
+                                </p:cTn>
+                              </p:par>
+                              <p:par>
+                                <p:cTn id="9" presetID="2" presetClass="entr" presetSubtype="8" fill="hold" grpId="0" nodeType="withEffect">
+                                  <p:stCondLst>
+                                    <p:cond delay="0"/>
+                                  </p:stCondLst>
+                                  <p:childTnLst>
+                                    <p:set>
+                                      <p:cBhvr>
+                                        <p:cTn id="10" dur="1" fill="hold">
+                                          <p:stCondLst>
+                                            <p:cond delay="0"/>
+                                          </p:stCondLst>
+                                        </p:cTn>
+                                        <p:tgtEl>
+                                          <p:spTgt spid="7"/>
+                                        </p:tgtEl>
+                                        <p:attrNameLst>
+                                          <p:attrName>style.visibility</p:attrName>
+                                        </p:attrNameLst>
+                                      </p:cBhvr>
+                                      <p:to>
+                                        <p:strVal val="visible"/>
+                                      </p:to>
+                                    </p:set>
+                                    <p:anim calcmode="lin" valueType="num">
+                                      <p:cBhvr additive="base">
+                                        <p:cTn id="11" dur="750" fill="hold"/>
+                                        <p:tgtEl>
+                                          <p:spTgt spid="7"/>
+                                        </p:tgtEl>
+                                        <p:attrNameLst>
+                                          <p:attrName>ppt_x</p:attrName>
+                                        </p:attrNameLst>
+                                      </p:cBhvr>
+                                      <p:tavLst>
+                                        <p:tav tm="0">
+                                          <p:val>
+                                            <p:strVal val="0-#ppt_w/2"/>
+                                          </p:val>
+                                        </p:tav>
+                                        <p:tav tm="100000">
+                                          <p:val>
+                                            <p:strVal val="#ppt_x"/>
+                                          </p:val>
+                                        </p:tav>
+                                      </p:tavLst>
+                                    </p:anim>
+                                    <p:anim calcmode="lin" valueType="num">
+                                      <p:cBhvr additive="base">
+                                        <p:cTn id="12" dur="750" fill="hold"/>
+                                        <p:tgtEl>
+                                          <p:spTgt spid="7"/>
+                                        </p:tgtEl>
+                                        <p:attrNameLst>
+                                          <p:attrName>ppt_y</p:attrName>
+                                        </p:attrNameLst>
+                                      </p:cBhvr>
+                                      <p:tavLst>
+                                        <p:tav tm="0">
+                                          <p:val>
+                                            <p:strVal val="#ppt_y"/>
+                                          </p:val>
+                                        </p:tav>
+                                        <p:tav tm="100000">
+                                          <p:val>
+                                            <p:strVal val="#ppt_y"/>
+                                          </p:val>
+                                        </p:tav>
+                                      </p:tavLst>
+                                    </p:anim>
+                                  </p:childTnLst>
+                                </p:cTn>
+                              </p:par>
+                              <p:par>
+                                <p:cTn id="13" presetID="2" presetClass="entr" presetSubtype="4" fill="hold" grpId="0" nodeType="withEffect">
+                                  <p:stCondLst>
+                                    <p:cond delay="0"/>
+                                  </p:stCondLst>
+                                  <p:childTnLst>
+                                    <p:set>
+                                      <p:cBhvr>
+                                        <p:cTn id="14" dur="1" fill="hold">
+                                          <p:stCondLst>
+                                            <p:cond delay="0"/>
+                                          </p:stCondLst>
+                                        </p:cTn>
+                                        <p:tgtEl>
+                                          <p:spTgt spid="8"/>
+                                        </p:tgtEl>
+                                        <p:attrNameLst>
+                                          <p:attrName>style.visibility</p:attrName>
+                                        </p:attrNameLst>
+                                      </p:cBhvr>
+                                      <p:to>
+                                        <p:strVal val="visible"/>
+                                      </p:to>
+                                    </p:set>
+                                    <p:anim calcmode="lin" valueType="num">
+                                      <p:cBhvr additive="base">
+                                        <p:cTn id="15" dur="750" fill="hold"/>
+                                        <p:tgtEl>
+                                          <p:spTgt spid="8"/>
+                                        </p:tgtEl>
+                                        <p:attrNameLst>
+                                          <p:attrName>ppt_x</p:attrName>
+                                        </p:attrNameLst>
+                                      </p:cBhvr>
+                                      <p:tavLst>
+                                        <p:tav tm="0">
+                                          <p:val>
+                                            <p:strVal val="#ppt_x"/>
+                                          </p:val>
+                                        </p:tav>
+                                        <p:tav tm="100000">
+                                          <p:val>
+                                            <p:strVal val="#ppt_x"/>
+                                          </p:val>
+                                        </p:tav>
+                                      </p:tavLst>
+                                    </p:anim>
+                                    <p:anim calcmode="lin" valueType="num">
+                                      <p:cBhvr additive="base">
+                                        <p:cTn id="16" dur="750" fill="hold"/>
+                                        <p:tgtEl>
+                                          <p:spTgt spid="8"/>
+                                        </p:tgtEl>
+                                        <p:attrNameLst>
+                                          <p:attrName>ppt_y</p:attrName>
+                                        </p:attrNameLst>
+                                      </p:cBhvr>
+                                      <p:tavLst>
+                                        <p:tav tm="0">
+                                          <p:val>
+                                            <p:strVal val="1+#ppt_h/2"/>
+                                          </p:val>
+                                        </p:tav>
+                                        <p:tav tm="100000">
+                                          <p:val>
+                                            <p:strVal val="#ppt_y"/>
+                                          </p:val>
+                                        </p:tav>
+                                      </p:tavLst>
+                                    </p:anim>
+                                  </p:childTnLst>
+                                </p:cTn>
+                              </p:par>
+                              <p:par>
+                                <p:cTn id="17" presetID="2" presetClass="entr" presetSubtype="6" fill="hold" grpId="0" nodeType="withEffect">
+                                  <p:stCondLst>
+                                    <p:cond delay="0"/>
+                                  </p:stCondLst>
+                                  <p:childTnLst>
+                                    <p:set>
+                                      <p:cBhvr>
+                                        <p:cTn id="18" dur="1" fill="hold">
+                                          <p:stCondLst>
+                                            <p:cond delay="0"/>
+                                          </p:stCondLst>
+                                        </p:cTn>
+                                        <p:tgtEl>
+                                          <p:spTgt spid="10"/>
+                                        </p:tgtEl>
+                                        <p:attrNameLst>
+                                          <p:attrName>style.visibility</p:attrName>
+                                        </p:attrNameLst>
+                                      </p:cBhvr>
+                                      <p:to>
+                                        <p:strVal val="visible"/>
+                                      </p:to>
+                                    </p:set>
+                                    <p:anim calcmode="lin" valueType="num">
+                                      <p:cBhvr additive="base">
+                                        <p:cTn id="19" dur="750" fill="hold"/>
+                                        <p:tgtEl>
+                                          <p:spTgt spid="10"/>
+                                        </p:tgtEl>
+                                        <p:attrNameLst>
+                                          <p:attrName>ppt_x</p:attrName>
+                                        </p:attrNameLst>
+                                      </p:cBhvr>
+                                      <p:tavLst>
+                                        <p:tav tm="0">
+                                          <p:val>
+                                            <p:strVal val="1+#ppt_w/2"/>
+                                          </p:val>
+                                        </p:tav>
+                                        <p:tav tm="100000">
+                                          <p:val>
+                                            <p:strVal val="#ppt_x"/>
+                                          </p:val>
+                                        </p:tav>
+                                      </p:tavLst>
+                                    </p:anim>
+                                    <p:anim calcmode="lin" valueType="num">
+                                      <p:cBhvr additive="base">
+                                        <p:cTn id="20" dur="750" fill="hold"/>
+                                        <p:tgtEl>
+                                          <p:spTgt spid="10"/>
+                                        </p:tgtEl>
+                                        <p:attrNameLst>
+                                          <p:attrName>ppt_y</p:attrName>
+                                        </p:attrNameLst>
+                                      </p:cBhvr>
+                                      <p:tavLst>
+                                        <p:tav tm="0">
+                                          <p:val>
+                                            <p:strVal val="1+#ppt_h/2"/>
+                                          </p:val>
+                                        </p:tav>
+                                        <p:tav tm="100000">
+                                          <p:val>
+                                            <p:strVal val="#ppt_y"/>
+                                          </p:val>
+                                        </p:tav>
+                                      </p:tavLst>
+                                    </p:anim>
+                                  </p:childTnLst>
+                                </p:cTn>
+                              </p:par>
+                              <p:par>
+                                <p:cTn id="21" presetID="10" presetClass="entr" presetSubtype="0" fill="hold" grpId="0" nodeType="withEffect">
+                                  <p:stCondLst>
+                                    <p:cond delay="0"/>
+                                  </p:stCondLst>
+                                  <p:childTnLst>
+                                    <p:set>
+                                      <p:cBhvr>
+                                        <p:cTn id="22" dur="1" fill="hold">
+                                          <p:stCondLst>
+                                            <p:cond delay="0"/>
+                                          </p:stCondLst>
+                                        </p:cTn>
+                                        <p:tgtEl>
+                                          <p:spTgt spid="2"/>
+                                        </p:tgtEl>
+                                        <p:attrNameLst>
+                                          <p:attrName>style.visibility</p:attrName>
+                                        </p:attrNameLst>
+                                      </p:cBhvr>
+                                      <p:to>
+                                        <p:strVal val="visible"/>
+                                      </p:to>
+                                    </p:set>
+                                    <p:animEffect transition="in" filter="fade">
+                                      <p:cBhvr>
+                                        <p:cTn id="23" dur="500"/>
+                                        <p:tgtEl>
+                                          <p:spTgt spid="2"/>
+                                        </p:tgtEl>
+                                      </p:cBhvr>
+                                    </p:animEffect>
+                                  </p:childTnLst>
+                                </p:cTn>
+                              </p:par>
+                              <p:par>
+                                <p:cTn id="24" presetID="10" presetClass="entr" presetSubtype="0" fill="hold" grpId="0" nodeType="withEffect">
+                                  <p:stCondLst>
+                                    <p:cond delay="0"/>
+                                  </p:stCondLst>
+                                  <p:childTnLst>
+                                    <p:set>
+                                      <p:cBhvr>
+                                        <p:cTn id="25" dur="1" fill="hold">
+                                          <p:stCondLst>
+                                            <p:cond delay="0"/>
+                                          </p:stCondLst>
+                                        </p:cTn>
+                                        <p:tgtEl>
+                                          <p:spTgt spid="5"/>
+                                        </p:tgtEl>
+                                        <p:attrNameLst>
+                                          <p:attrName>style.visibility</p:attrName>
+                                        </p:attrNameLst>
+                                      </p:cBhvr>
+                                      <p:to>
+                                        <p:strVal val="visible"/>
+                                      </p:to>
+                                    </p:set>
+                                    <p:animEffect transition="in" filter="fade">
+                                      <p:cBhvr>
+                                        <p:cTn id="26" dur="500"/>
+                                        <p:tgtEl>
+                                          <p:spTgt spid="5"/>
+                                        </p:tgtEl>
+                                      </p:cBhvr>
+                                    </p:animEffect>
+                                  </p:childTnLst>
+                                </p:cTn>
+                              </p:par>
+                              <p:par>
+                                <p:cTn id="27" presetID="10" presetClass="entr" presetSubtype="0" fill="hold" nodeType="withEffect">
+                                  <p:stCondLst>
+                                    <p:cond delay="0"/>
+                                  </p:stCondLst>
+                                  <p:childTnLst>
+                                    <p:set>
+                                      <p:cBhvr>
+                                        <p:cTn id="28" dur="1" fill="hold">
+                                          <p:stCondLst>
+                                            <p:cond delay="0"/>
+                                          </p:stCondLst>
+                                        </p:cTn>
+                                        <p:tgtEl>
+                                          <p:spTgt spid="6"/>
+                                        </p:tgtEl>
+                                        <p:attrNameLst>
+                                          <p:attrName>style.visibility</p:attrName>
+                                        </p:attrNameLst>
+                                      </p:cBhvr>
+                                      <p:to>
+                                        <p:strVal val="visible"/>
+                                      </p:to>
+                                    </p:set>
+                                    <p:animEffect transition="in" filter="fade">
+                                      <p:cBhvr>
+                                        <p:cTn id="29" dur="500"/>
+                                        <p:tgtEl>
+                                          <p:spTgt spid="6"/>
+                                        </p:tgtEl>
+                                      </p:cBhvr>
+                                    </p:animEffect>
+                                  </p:childTnLst>
+                                </p:cTn>
+                              </p:par>
+                            </p:childTnLst>
+                          </p:cTn>
+                        </p:par>
+                      </p:childTnLst>
+                    </p:cTn>
+                  </p:par>
+                </p:childTnLst>
+              </p:cTn>
+              <p:prevCondLst>
+                <p:cond evt="onPrev" delay="0">
+                  <p:tgtEl>
+                    <p:sldTgt/>
+                  </p:tgtEl>
+                </p:cond>
+              </p:prevCondLst>
+              <p:nextCondLst>
+                <p:cond evt="onNext" delay="0">
+                  <p:tgtEl>
+                    <p:sldTgt/>
+                  </p:tgtEl>
+                </p:cond>
+              </p:nextCondLst>
+            </p:seq>
+          </p:childTnLst>
+        </p:cTn>
+      </p:par>
+    </p:tnLst>
+    <p:bldLst>
+      <p:bldP spid="10" grpId="0" animBg="1"/>
+      <p:bldP spid="2" grpId="0"/>
+      <p:bldP spid="5" grpId="0"/>
+      <p:bldP spid="7" grpId="0" animBg="1"/>
+      <p:bldP spid="8" grpId="0" animBg="1"/>
+      <p:bldP spid="9" grpId="0" animBg="1"/>
+    </p:bldLst>
+  </p:timing>
+</p:sld>
+</file>
+
+<file path=ppt/slides/slide7.xml><?xml version="1.0" encoding="utf-8"?>
+<p:sld xmlns:a="http://schemas.openxmlformats.org/drawingml/2006/main" xmlns:r="http://schemas.openxmlformats.org/officeDocument/2006/relationships" xmlns:p="http://schemas.openxmlformats.org/presentationml/2006/main">
+  <p:cSld>
+    <p:spTree>
+      <p:nvGrpSpPr>
+        <p:cNvPr id="1" name=""/>
+        <p:cNvGrpSpPr/>
+        <p:nvPr/>
+      </p:nvGrpSpPr>
+      <p:grpSpPr>
+        <a:xfrm>
+          <a:off x="0" y="0"/>
+          <a:ext cx="0" cy="0"/>
+          <a:chOff x="0" y="0"/>
+          <a:chExt cx="0" cy="0"/>
+        </a:xfrm>
+      </p:grpSpPr>
+      <p:pic>
+        <p:nvPicPr>
+          <p:cNvPr id="11" name="Picture 5" descr="Professional Song Mastering - Miami - RoofTop Recording Studios"/>
+          <p:cNvPicPr>
+            <a:picLocks noChangeAspect="1" noChangeArrowheads="1"/>
+          </p:cNvPicPr>
+          <p:nvPr/>
+        </p:nvPicPr>
+        <p:blipFill>
+          <a:blip r:embed="rId2" cstate="print">
+            <a:extLst>
+              <a:ext uri="{28A0092B-C50C-407E-A947-70E740481C1C}">
+                <a14:useLocalDpi xmlns:a14="http://schemas.microsoft.com/office/drawing/2010/main" val="0"/>
+              </a:ext>
+            </a:extLst>
+          </a:blip>
+          <a:srcRect/>
+          <a:stretch>
+            <a:fillRect/>
+          </a:stretch>
+        </p:blipFill>
+        <p:spPr bwMode="auto">
+          <a:xfrm>
+            <a:off x="3983029" y="2324350"/>
+            <a:ext cx="5140644" cy="2619312"/>
+          </a:xfrm>
+          <a:prstGeom prst="roundRect">
+            <a:avLst>
+              <a:gd name="adj" fmla="val 8594"/>
+            </a:avLst>
+          </a:prstGeom>
+          <a:solidFill>
+            <a:srgbClr val="FFFFFF">
+              <a:shade val="85000"/>
+            </a:srgbClr>
+          </a:solidFill>
+          <a:ln>
+            <a:noFill/>
+          </a:ln>
+          <a:effectLst>
+            <a:reflection blurRad="12700" stA="38000" endPos="28000" dist="5000" dir="5400000" sy="-100000" algn="bl" rotWithShape="0"/>
+          </a:effectLst>
+        </p:spPr>
+      </p:pic>
+      <p:sp>
+        <p:nvSpPr>
+          <p:cNvPr id="10" name="Ellipszis 9"/>
+          <p:cNvSpPr/>
+          <p:nvPr/>
+        </p:nvSpPr>
+        <p:spPr>
+          <a:xfrm>
+            <a:off x="9670774" y="4446104"/>
+            <a:ext cx="3627783" cy="3319669"/>
+          </a:xfrm>
+          <a:prstGeom prst="ellipse">
+            <a:avLst/>
+          </a:prstGeom>
+          <a:solidFill>
+            <a:schemeClr val="accent5">
+              <a:lumMod val="75000"/>
+            </a:schemeClr>
+          </a:solidFill>
+          <a:ln>
+            <a:solidFill>
+              <a:schemeClr val="tx1"/>
+            </a:solidFill>
+          </a:ln>
+        </p:spPr>
+        <p:style>
+          <a:lnRef idx="2">
+            <a:schemeClr val="accent1">
+              <a:shade val="50000"/>
+            </a:schemeClr>
+          </a:lnRef>
+          <a:fillRef idx="1">
+            <a:schemeClr val="accent1"/>
+          </a:fillRef>
+          <a:effectRef idx="0">
+            <a:schemeClr val="accent1"/>
+          </a:effectRef>
+          <a:fontRef idx="minor">
+            <a:schemeClr val="lt1"/>
+          </a:fontRef>
+        </p:style>
+        <p:txBody>
+          <a:bodyPr rtlCol="0" anchor="ctr"/>
+          <a:lstStyle/>
+          <a:p>
+            <a:pPr algn="ctr"/>
+            <a:endParaRPr lang="hu-HU"/>
+          </a:p>
+        </p:txBody>
+      </p:sp>
+      <p:sp>
+        <p:nvSpPr>
+          <p:cNvPr id="2" name="Cím 1"/>
+          <p:cNvSpPr>
+            <a:spLocks noGrp="1"/>
+          </p:cNvSpPr>
+          <p:nvPr>
+            <p:ph type="title"/>
+          </p:nvPr>
+        </p:nvSpPr>
+        <p:spPr/>
+        <p:txBody>
+          <a:bodyPr/>
+          <a:lstStyle/>
+          <a:p>
+            <a:pPr algn="ctr"/>
+            <a:r>
+              <a:rPr lang="hu-HU" b="1" dirty="0"/>
+              <a:t>Mastering</a:t>
+            </a:r>
+          </a:p>
+        </p:txBody>
+      </p:sp>
+      <p:sp>
+        <p:nvSpPr>
+          <p:cNvPr id="5" name="Rectangle 1"/>
+          <p:cNvSpPr>
+            <a:spLocks noChangeArrowheads="1"/>
+          </p:cNvSpPr>
+          <p:nvPr/>
+        </p:nvSpPr>
+        <p:spPr bwMode="auto">
+          <a:xfrm>
+            <a:off x="838200" y="2351806"/>
+            <a:ext cx="3004038" cy="3139321"/>
+          </a:xfrm>
+          <a:prstGeom prst="rect">
+            <a:avLst/>
+          </a:prstGeom>
+          <a:noFill/>
+          <a:ln>
+            <a:noFill/>
+          </a:ln>
+          <a:effectLst/>
+          <a:extLst>
+            <a:ext uri="{909E8E84-426E-40DD-AFC4-6F175D3DCCD1}">
+              <a14:hiddenFill xmlns:a14="http://schemas.microsoft.com/office/drawing/2010/main">
+                <a:solidFill>
+                  <a:schemeClr val="accent1"/>
+                </a:solidFill>
+              </a14:hiddenFill>
+            </a:ext>
+            <a:ext uri="{91240B29-F687-4F45-9708-019B960494DF}">
+              <a14:hiddenLine xmlns:a14="http://schemas.microsoft.com/office/drawing/2010/main" w="9525">
+                <a:solidFill>
+                  <a:schemeClr val="tx1"/>
+                </a:solidFill>
+                <a:miter lim="800000"/>
+                <a:headEnd/>
+                <a:tailEnd/>
+              </a14:hiddenLine>
+            </a:ext>
+            <a:ext uri="{AF507438-7753-43E0-B8FC-AC1667EBCBE1}">
+              <a14:hiddenEffects xmlns:a14="http://schemas.microsoft.com/office/drawing/2010/main">
+                <a:effectLst>
+                  <a:outerShdw dist="35921" dir="2700000" algn="ctr" rotWithShape="0">
+                    <a:schemeClr val="bg2"/>
+                  </a:outerShdw>
+                </a:effectLst>
+              </a14:hiddenEffects>
+            </a:ext>
+          </a:extLst>
+        </p:spPr>
+        <p:txBody>
+          <a:bodyPr vert="horz" wrap="square" lIns="91440" tIns="45720" rIns="91440" bIns="45720" numCol="1" anchor="ctr" anchorCtr="0" compatLnSpc="1">
+            <a:prstTxWarp prst="textNoShape">
+              <a:avLst/>
+            </a:prstTxWarp>
+            <a:spAutoFit/>
+          </a:bodyPr>
+          <a:lstStyle/>
+          <a:p>
+            <a:pPr lvl="0" eaLnBrk="0" fontAlgn="base" hangingPunct="0">
+              <a:spcBef>
+                <a:spcPct val="0"/>
+              </a:spcBef>
+              <a:spcAft>
+                <a:spcPct val="0"/>
+              </a:spcAft>
+            </a:pPr>
+            <a:r>
+              <a:rPr lang="hu-HU" altLang="hu-HU" u="sng" dirty="0">
+                <a:latin typeface="Arial" panose="020B0604020202020204" pitchFamily="34" charset="0"/>
+              </a:rPr>
+              <a:t>Röviden:</a:t>
+            </a:r>
+          </a:p>
+          <a:p>
+            <a:pPr lvl="0" eaLnBrk="0" fontAlgn="base" hangingPunct="0">
+              <a:spcBef>
+                <a:spcPct val="0"/>
+              </a:spcBef>
+              <a:spcAft>
+                <a:spcPct val="0"/>
+              </a:spcAft>
+              <a:buFontTx/>
+              <a:buChar char="•"/>
+            </a:pPr>
+            <a:endParaRPr lang="hu-HU" altLang="hu-HU" dirty="0">
+              <a:latin typeface="Arial" panose="020B0604020202020204" pitchFamily="34" charset="0"/>
+            </a:endParaRPr>
+          </a:p>
+          <a:p>
+            <a:pPr lvl="0" eaLnBrk="0" fontAlgn="base" hangingPunct="0">
+              <a:spcBef>
+                <a:spcPct val="0"/>
+              </a:spcBef>
+              <a:spcAft>
+                <a:spcPct val="0"/>
+              </a:spcAft>
+              <a:buFontTx/>
+              <a:buChar char="•"/>
+            </a:pPr>
+            <a:r>
+              <a:rPr lang="hu-HU" altLang="hu-HU" dirty="0">
+                <a:latin typeface="Arial" panose="020B0604020202020204" pitchFamily="34" charset="0"/>
+              </a:rPr>
+              <a:t>Végső hangerő</a:t>
+            </a:r>
+          </a:p>
+          <a:p>
+            <a:pPr lvl="0" eaLnBrk="0" fontAlgn="base" hangingPunct="0">
+              <a:spcBef>
+                <a:spcPct val="0"/>
+              </a:spcBef>
+              <a:spcAft>
+                <a:spcPct val="0"/>
+              </a:spcAft>
+              <a:buFontTx/>
+              <a:buChar char="•"/>
+            </a:pPr>
+            <a:endParaRPr lang="hu-HU" altLang="hu-HU" dirty="0">
+              <a:latin typeface="Arial" panose="020B0604020202020204" pitchFamily="34" charset="0"/>
+            </a:endParaRPr>
+          </a:p>
+          <a:p>
+            <a:pPr lvl="0" eaLnBrk="0" fontAlgn="base" hangingPunct="0">
+              <a:spcBef>
+                <a:spcPct val="0"/>
+              </a:spcBef>
+              <a:spcAft>
+                <a:spcPct val="0"/>
+              </a:spcAft>
+              <a:buFontTx/>
+              <a:buChar char="•"/>
+            </a:pPr>
+            <a:r>
+              <a:rPr lang="hu-HU" altLang="hu-HU" dirty="0">
+                <a:latin typeface="Arial" panose="020B0604020202020204" pitchFamily="34" charset="0"/>
+              </a:rPr>
+              <a:t>Simítás, polírozás</a:t>
+            </a:r>
+          </a:p>
+          <a:p>
+            <a:pPr lvl="0" eaLnBrk="0" fontAlgn="base" hangingPunct="0">
+              <a:spcBef>
+                <a:spcPct val="0"/>
+              </a:spcBef>
+              <a:spcAft>
+                <a:spcPct val="0"/>
+              </a:spcAft>
+              <a:buFontTx/>
+              <a:buChar char="•"/>
+            </a:pPr>
+            <a:endParaRPr lang="hu-HU" altLang="hu-HU" dirty="0">
+              <a:latin typeface="Arial" panose="020B0604020202020204" pitchFamily="34" charset="0"/>
+            </a:endParaRPr>
+          </a:p>
+          <a:p>
+            <a:pPr lvl="0" eaLnBrk="0" fontAlgn="base" hangingPunct="0">
+              <a:spcBef>
+                <a:spcPct val="0"/>
+              </a:spcBef>
+              <a:spcAft>
+                <a:spcPct val="0"/>
+              </a:spcAft>
+              <a:buFontTx/>
+              <a:buChar char="•"/>
+            </a:pPr>
+            <a:r>
+              <a:rPr lang="hu-HU" altLang="hu-HU" dirty="0">
+                <a:latin typeface="Arial" panose="020B0604020202020204" pitchFamily="34" charset="0"/>
+              </a:rPr>
+              <a:t>Egységes hangzás mindenhol</a:t>
+            </a:r>
+          </a:p>
+          <a:p>
+            <a:pPr lvl="0" eaLnBrk="0" fontAlgn="base" hangingPunct="0">
+              <a:spcBef>
+                <a:spcPct val="0"/>
+              </a:spcBef>
+              <a:spcAft>
+                <a:spcPct val="0"/>
+              </a:spcAft>
+              <a:buFontTx/>
+              <a:buChar char="•"/>
+            </a:pPr>
+            <a:endParaRPr lang="hu-HU" altLang="hu-HU" dirty="0">
+              <a:latin typeface="Arial" panose="020B0604020202020204" pitchFamily="34" charset="0"/>
+            </a:endParaRPr>
+          </a:p>
+          <a:p>
+            <a:pPr lvl="0" eaLnBrk="0" fontAlgn="base" hangingPunct="0">
+              <a:spcBef>
+                <a:spcPct val="0"/>
+              </a:spcBef>
+              <a:spcAft>
+                <a:spcPct val="0"/>
+              </a:spcAft>
+              <a:buFontTx/>
+              <a:buChar char="•"/>
+            </a:pPr>
+            <a:r>
+              <a:rPr lang="hu-HU" altLang="hu-HU" dirty="0">
+                <a:latin typeface="Arial" panose="020B0604020202020204" pitchFamily="34" charset="0"/>
+              </a:rPr>
+              <a:t>Profi, kész produktum</a:t>
+            </a:r>
+          </a:p>
+          <a:p>
+            <a:pPr marL="0" marR="0" lvl="0" indent="0" algn="l" defTabSz="914400" rtl="0" eaLnBrk="0" fontAlgn="base" latinLnBrk="0" hangingPunct="0">
+              <a:lnSpc>
+                <a:spcPct val="100000"/>
+              </a:lnSpc>
+              <a:spcBef>
+                <a:spcPct val="0"/>
+              </a:spcBef>
+              <a:spcAft>
+                <a:spcPct val="0"/>
+              </a:spcAft>
+              <a:buClrTx/>
+              <a:buSzTx/>
+              <a:tabLst/>
+            </a:pPr>
+            <a:endParaRPr kumimoji="0" lang="hu-HU" altLang="hu-HU" sz="1800" b="0" i="0" u="none" strike="noStrike" cap="none" normalizeH="0" baseline="0" dirty="0">
+              <a:ln>
+                <a:noFill/>
+              </a:ln>
+              <a:solidFill>
+                <a:schemeClr val="tx1"/>
+              </a:solidFill>
+              <a:effectLst/>
+              <a:latin typeface="Arial" panose="020B0604020202020204" pitchFamily="34" charset="0"/>
+            </a:endParaRPr>
+          </a:p>
+        </p:txBody>
+      </p:sp>
+      <p:sp>
+        <p:nvSpPr>
+          <p:cNvPr id="7" name="Ellipszis 6"/>
+          <p:cNvSpPr/>
+          <p:nvPr/>
+        </p:nvSpPr>
+        <p:spPr>
+          <a:xfrm>
+            <a:off x="1466403" y="365125"/>
+            <a:ext cx="1747631" cy="1664899"/>
+          </a:xfrm>
+          <a:prstGeom prst="ellipse">
+            <a:avLst/>
+          </a:prstGeom>
+          <a:solidFill>
+            <a:srgbClr val="C00000"/>
+          </a:solidFill>
+          <a:ln>
+            <a:solidFill>
+              <a:schemeClr val="tx1"/>
+            </a:solidFill>
+          </a:ln>
+        </p:spPr>
+        <p:style>
+          <a:lnRef idx="2">
+            <a:schemeClr val="accent1">
+              <a:shade val="50000"/>
+            </a:schemeClr>
+          </a:lnRef>
+          <a:fillRef idx="1">
+            <a:schemeClr val="accent1"/>
+          </a:fillRef>
+          <a:effectRef idx="0">
+            <a:schemeClr val="accent1"/>
+          </a:effectRef>
+          <a:fontRef idx="minor">
+            <a:schemeClr val="lt1"/>
+          </a:fontRef>
+        </p:style>
+        <p:txBody>
+          <a:bodyPr rtlCol="0" anchor="ctr"/>
+          <a:lstStyle/>
+          <a:p>
+            <a:pPr algn="ctr"/>
+            <a:endParaRPr lang="hu-HU"/>
+          </a:p>
+        </p:txBody>
+      </p:sp>
+      <p:sp>
+        <p:nvSpPr>
+          <p:cNvPr id="8" name="Ellipszis 7"/>
+          <p:cNvSpPr/>
+          <p:nvPr/>
+        </p:nvSpPr>
+        <p:spPr>
+          <a:xfrm>
+            <a:off x="8576572" y="5035652"/>
+            <a:ext cx="2188403" cy="2140571"/>
+          </a:xfrm>
+          <a:prstGeom prst="ellipse">
+            <a:avLst/>
+          </a:prstGeom>
+          <a:solidFill>
+            <a:srgbClr val="C00000"/>
+          </a:solidFill>
+          <a:ln>
+            <a:solidFill>
+              <a:schemeClr val="tx1"/>
+            </a:solidFill>
+          </a:ln>
+        </p:spPr>
+        <p:style>
+          <a:lnRef idx="2">
+            <a:schemeClr val="accent1">
+              <a:shade val="50000"/>
+            </a:schemeClr>
+          </a:lnRef>
+          <a:fillRef idx="1">
+            <a:schemeClr val="accent1"/>
+          </a:fillRef>
+          <a:effectRef idx="0">
+            <a:schemeClr val="accent1"/>
+          </a:effectRef>
+          <a:fontRef idx="minor">
+            <a:schemeClr val="lt1"/>
+          </a:fontRef>
+        </p:style>
+        <p:txBody>
+          <a:bodyPr rtlCol="0" anchor="ctr"/>
+          <a:lstStyle/>
+          <a:p>
+            <a:pPr algn="ctr"/>
+            <a:endParaRPr lang="hu-HU"/>
+          </a:p>
+        </p:txBody>
+      </p:sp>
+      <p:sp>
+        <p:nvSpPr>
+          <p:cNvPr id="9" name="Ellipszis 8"/>
+          <p:cNvSpPr/>
+          <p:nvPr/>
+        </p:nvSpPr>
+        <p:spPr>
+          <a:xfrm>
+            <a:off x="-1174474" y="-995319"/>
+            <a:ext cx="3627783" cy="3319669"/>
+          </a:xfrm>
+          <a:prstGeom prst="ellipse">
+            <a:avLst/>
+          </a:prstGeom>
+          <a:solidFill>
+            <a:schemeClr val="accent2">
+              <a:lumMod val="50000"/>
+            </a:schemeClr>
+          </a:solidFill>
+          <a:ln>
+            <a:solidFill>
+              <a:schemeClr val="tx1"/>
+            </a:solidFill>
+          </a:ln>
+        </p:spPr>
+        <p:style>
+          <a:lnRef idx="2">
+            <a:schemeClr val="accent1">
+              <a:shade val="50000"/>
+            </a:schemeClr>
+          </a:lnRef>
+          <a:fillRef idx="1">
+            <a:schemeClr val="accent1"/>
+          </a:fillRef>
+          <a:effectRef idx="0">
+            <a:schemeClr val="accent1"/>
+          </a:effectRef>
+          <a:fontRef idx="minor">
+            <a:schemeClr val="lt1"/>
+          </a:fontRef>
+        </p:style>
+        <p:txBody>
+          <a:bodyPr rtlCol="0" anchor="ctr"/>
+          <a:lstStyle/>
+          <a:p>
+            <a:pPr algn="ctr"/>
+            <a:endParaRPr lang="hu-HU"/>
+          </a:p>
+        </p:txBody>
+      </p:sp>
+    </p:spTree>
+    <p:extLst>
+      <p:ext uri="{BB962C8B-B14F-4D97-AF65-F5344CB8AC3E}">
+        <p14:creationId xmlns:p14="http://schemas.microsoft.com/office/powerpoint/2010/main" val="3094951212"/>
+      </p:ext>
+    </p:extLst>
+  </p:cSld>
+  <p:clrMapOvr>
+    <a:masterClrMapping/>
+  </p:clrMapOvr>
+  <p:timing>
+    <p:tnLst>
+      <p:par>
+        <p:cTn id="1" dur="indefinite" restart="never" nodeType="tmRoot">
+          <p:childTnLst>
+            <p:seq concurrent="1" nextAc="seek">
+              <p:cTn id="2" dur="indefinite" nodeType="mainSeq">
+                <p:childTnLst>
+                  <p:par>
+                    <p:cTn id="3" fill="hold">
+                      <p:stCondLst>
+                        <p:cond delay="indefinite"/>
+                        <p:cond evt="onBegin" delay="0">
+                          <p:tn val="2"/>
+                        </p:cond>
+                      </p:stCondLst>
+                      <p:childTnLst>
+                        <p:par>
+                          <p:cTn id="4" fill="hold">
+                            <p:stCondLst>
+                              <p:cond delay="0"/>
+                            </p:stCondLst>
+                            <p:childTnLst>
+                              <p:par>
+                                <p:cTn id="5" presetID="22" presetClass="entr" presetSubtype="4" fill="hold" grpId="0" nodeType="withEffect">
+                                  <p:stCondLst>
+                                    <p:cond delay="0"/>
+                                  </p:stCondLst>
+                                  <p:childTnLst>
+                                    <p:set>
+                                      <p:cBhvr>
+                                        <p:cTn id="6" dur="1" fill="hold">
+                                          <p:stCondLst>
+                                            <p:cond delay="0"/>
+                                          </p:stCondLst>
+                                        </p:cTn>
+                                        <p:tgtEl>
+                                          <p:spTgt spid="2"/>
+                                        </p:tgtEl>
+                                        <p:attrNameLst>
+                                          <p:attrName>style.visibility</p:attrName>
+                                        </p:attrNameLst>
+                                      </p:cBhvr>
+                                      <p:to>
+                                        <p:strVal val="visible"/>
+                                      </p:to>
+                                    </p:set>
+                                    <p:animEffect transition="in" filter="wipe(down)">
+                                      <p:cBhvr>
+                                        <p:cTn id="7" dur="500"/>
+                                        <p:tgtEl>
+                                          <p:spTgt spid="2"/>
+                                        </p:tgtEl>
+                                      </p:cBhvr>
+                                    </p:animEffect>
+                                  </p:childTnLst>
+                                </p:cTn>
+                              </p:par>
+                              <p:par>
+                                <p:cTn id="8" presetID="22" presetClass="entr" presetSubtype="4" fill="hold" nodeType="withEffect">
+                                  <p:stCondLst>
+                                    <p:cond delay="0"/>
+                                  </p:stCondLst>
+                                  <p:childTnLst>
+                                    <p:set>
+                                      <p:cBhvr>
+                                        <p:cTn id="9" dur="1" fill="hold">
+                                          <p:stCondLst>
+                                            <p:cond delay="0"/>
+                                          </p:stCondLst>
+                                        </p:cTn>
+                                        <p:tgtEl>
+                                          <p:spTgt spid="11"/>
+                                        </p:tgtEl>
+                                        <p:attrNameLst>
+                                          <p:attrName>style.visibility</p:attrName>
+                                        </p:attrNameLst>
+                                      </p:cBhvr>
+                                      <p:to>
+                                        <p:strVal val="visible"/>
+                                      </p:to>
+                                    </p:set>
+                                    <p:animEffect transition="in" filter="wipe(down)">
+                                      <p:cBhvr>
+                                        <p:cTn id="10" dur="500"/>
+                                        <p:tgtEl>
+                                          <p:spTgt spid="11"/>
+                                        </p:tgtEl>
+                                      </p:cBhvr>
+                                    </p:animEffect>
+                                  </p:childTnLst>
+                                </p:cTn>
+                              </p:par>
+                              <p:par>
+                                <p:cTn id="11" presetID="22" presetClass="entr" presetSubtype="4" fill="hold" grpId="0" nodeType="withEffect">
+                                  <p:stCondLst>
+                                    <p:cond delay="0"/>
+                                  </p:stCondLst>
+                                  <p:childTnLst>
+                                    <p:set>
+                                      <p:cBhvr>
+                                        <p:cTn id="12" dur="1" fill="hold">
+                                          <p:stCondLst>
+                                            <p:cond delay="0"/>
+                                          </p:stCondLst>
+                                        </p:cTn>
+                                        <p:tgtEl>
+                                          <p:spTgt spid="5"/>
+                                        </p:tgtEl>
+                                        <p:attrNameLst>
+                                          <p:attrName>style.visibility</p:attrName>
+                                        </p:attrNameLst>
+                                      </p:cBhvr>
+                                      <p:to>
+                                        <p:strVal val="visible"/>
+                                      </p:to>
+                                    </p:set>
+                                    <p:animEffect transition="in" filter="wipe(down)">
+                                      <p:cBhvr>
+                                        <p:cTn id="13" dur="500"/>
+                                        <p:tgtEl>
+                                          <p:spTgt spid="5"/>
+                                        </p:tgtEl>
+                                      </p:cBhvr>
+                                    </p:animEffect>
+                                  </p:childTnLst>
+                                </p:cTn>
+                              </p:par>
+                            </p:childTnLst>
+                          </p:cTn>
+                        </p:par>
+                      </p:childTnLst>
+                    </p:cTn>
+                  </p:par>
+                </p:childTnLst>
+              </p:cTn>
+              <p:prevCondLst>
+                <p:cond evt="onPrev" delay="0">
+                  <p:tgtEl>
+                    <p:sldTgt/>
+                  </p:tgtEl>
+                </p:cond>
+              </p:prevCondLst>
+              <p:nextCondLst>
+                <p:cond evt="onNext" delay="0">
+                  <p:tgtEl>
+                    <p:sldTgt/>
+                  </p:tgtEl>
+                </p:cond>
+              </p:nextCondLst>
+            </p:seq>
+          </p:childTnLst>
+        </p:cTn>
+      </p:par>
+    </p:tnLst>
+    <p:bldLst>
+      <p:bldP spid="2" grpId="0"/>
+      <p:bldP spid="5" grpId="0"/>
+    </p:bldLst>
+  </p:timing>
 </p:sld>
 </file>
 

</xml_diff>